<commit_message>
add setLocation dev guide
</commit_message>
<xml_diff>
--- a/docs/diagrams/LinkedInShareSequenceDiagram.pptx
+++ b/docs/diagrams/LinkedInShareSequenceDiagram.pptx
@@ -3451,7 +3451,7 @@
         <p:spPr>
           <a:xfrm>
             <a:off x="152400" y="457200"/>
-            <a:ext cx="8847118" cy="4343400"/>
+            <a:ext cx="8847118" cy="5257800"/>
           </a:xfrm>
           <a:prstGeom prst="roundRect">
             <a:avLst>
@@ -3617,8 +3617,8 @@
         </p:nvSpPr>
         <p:spPr>
           <a:xfrm>
-            <a:off x="2246791" y="1496610"/>
-            <a:ext cx="126548" cy="3147616"/>
+            <a:off x="2246790" y="1496609"/>
+            <a:ext cx="143441" cy="3684989"/>
           </a:xfrm>
           <a:prstGeom prst="rect">
             <a:avLst/>
@@ -3700,15 +3700,23 @@
           <a:p>
             <a:pPr algn="ctr"/>
             <a:r>
+              <a:rPr lang="en-US" sz="1600" dirty="0" err="1" smtClean="0">
+                <a:solidFill>
+                  <a:schemeClr val="bg1"/>
+                </a:solidFill>
+              </a:rPr>
+              <a:t>s:Share</a:t>
+            </a:r>
+            <a:r>
               <a:rPr lang="en-US" sz="1600" dirty="0" smtClean="0">
                 <a:solidFill>
                   <a:schemeClr val="bg1"/>
                 </a:solidFill>
               </a:rPr>
-              <a:t>:Share </a:t>
-            </a:r>
-            <a:r>
-              <a:rPr lang="en-US" sz="1600" smtClean="0">
+              <a:t> </a:t>
+            </a:r>
+            <a:r>
+              <a:rPr lang="en-US" sz="1600" dirty="0" smtClean="0">
                 <a:solidFill>
                   <a:schemeClr val="bg1"/>
                 </a:solidFill>
@@ -3770,8 +3778,8 @@
         </p:nvSpPr>
         <p:spPr>
           <a:xfrm>
-            <a:off x="4660568" y="1604108"/>
-            <a:ext cx="158742" cy="2999513"/>
+            <a:off x="4607917" y="1604109"/>
+            <a:ext cx="211393" cy="357994"/>
           </a:xfrm>
           <a:prstGeom prst="rect">
             <a:avLst/>
@@ -3860,7 +3868,7 @@
         </p:nvSpPr>
         <p:spPr>
           <a:xfrm>
-            <a:off x="6858000" y="1686099"/>
+            <a:off x="6858000" y="2250520"/>
             <a:ext cx="152400" cy="276003"/>
           </a:xfrm>
           <a:prstGeom prst="rect">
@@ -4008,7 +4016,7 @@
         </p:nvCxnSpPr>
         <p:spPr>
           <a:xfrm flipV="1">
-            <a:off x="4937680" y="1686099"/>
+            <a:off x="4937680" y="2250520"/>
             <a:ext cx="1996520" cy="7864"/>
           </a:xfrm>
           <a:prstGeom prst="straightConnector1">
@@ -4046,7 +4054,7 @@
         </p:nvCxnSpPr>
         <p:spPr>
           <a:xfrm flipV="1">
-            <a:off x="4871108" y="1962102"/>
+            <a:off x="4871108" y="2526523"/>
             <a:ext cx="2063092" cy="23379"/>
           </a:xfrm>
           <a:prstGeom prst="straightConnector1">
@@ -4084,7 +4092,7 @@
         </p:nvCxnSpPr>
         <p:spPr>
           <a:xfrm>
-            <a:off x="1062987" y="4648200"/>
+            <a:off x="1062987" y="5181600"/>
             <a:ext cx="1196051" cy="0"/>
           </a:xfrm>
           <a:prstGeom prst="straightConnector1">
@@ -4175,7 +4183,7 @@
         </p:nvSpPr>
         <p:spPr>
           <a:xfrm>
-            <a:off x="1327258" y="4403101"/>
+            <a:off x="1327258" y="4936501"/>
             <a:ext cx="762000" cy="215444"/>
           </a:xfrm>
           <a:prstGeom prst="rect">
@@ -4271,7 +4279,7 @@
           <p:cNvPr id="67" name="Straight Arrow Connector 66">
             <a:extLst>
               <a:ext uri="{FF2B5EF4-FFF2-40B4-BE49-F238E27FC236}">
-                <a16:creationId xmlns="" xmlns:a16="http://schemas.microsoft.com/office/drawing/2014/main" id="{D881596E-177C-4FDC-8E60-CAB90B3D5FAB}"/>
+                <a16:creationId xmlns:a16="http://schemas.microsoft.com/office/drawing/2014/main" xmlns="" id="{D881596E-177C-4FDC-8E60-CAB90B3D5FAB}"/>
               </a:ext>
             </a:extLst>
           </p:cNvPr>
@@ -4318,7 +4326,7 @@
         </p:nvSpPr>
         <p:spPr>
           <a:xfrm>
-            <a:off x="5521164" y="1441795"/>
+            <a:off x="5521164" y="2006216"/>
             <a:ext cx="907505" cy="184666"/>
           </a:xfrm>
           <a:prstGeom prst="rect">
@@ -4363,7 +4371,7 @@
         </p:nvSpPr>
         <p:spPr>
           <a:xfrm>
-            <a:off x="5724410" y="1736017"/>
+            <a:off x="5724410" y="2300438"/>
             <a:ext cx="220343" cy="215444"/>
           </a:xfrm>
           <a:prstGeom prst="rect">
@@ -4502,7 +4510,7 @@
         </p:nvSpPr>
         <p:spPr>
           <a:xfrm>
-            <a:off x="4871048" y="2177991"/>
+            <a:off x="4871048" y="2742412"/>
             <a:ext cx="446103" cy="543861"/>
           </a:xfrm>
           <a:prstGeom prst="curvedLeftArrow">
@@ -4555,7 +4563,7 @@
         </p:nvSpPr>
         <p:spPr>
           <a:xfrm>
-            <a:off x="5368889" y="2286000"/>
+            <a:off x="5368889" y="2850421"/>
             <a:ext cx="1260511" cy="184666"/>
           </a:xfrm>
           <a:prstGeom prst="rect">
@@ -4600,7 +4608,7 @@
         </p:nvSpPr>
         <p:spPr>
           <a:xfrm>
-            <a:off x="4880274" y="2818578"/>
+            <a:off x="4880274" y="3382999"/>
             <a:ext cx="446103" cy="543861"/>
           </a:xfrm>
           <a:prstGeom prst="curvedLeftArrow">
@@ -4653,7 +4661,7 @@
         </p:nvSpPr>
         <p:spPr>
           <a:xfrm>
-            <a:off x="5352229" y="2971188"/>
+            <a:off x="5352229" y="3535609"/>
             <a:ext cx="1501709" cy="184666"/>
           </a:xfrm>
           <a:prstGeom prst="rect">
@@ -4698,7 +4706,7 @@
         </p:nvCxnSpPr>
         <p:spPr>
           <a:xfrm>
-            <a:off x="4853964" y="3589585"/>
+            <a:off x="4853964" y="4154006"/>
             <a:ext cx="3469377" cy="4580"/>
           </a:xfrm>
           <a:prstGeom prst="straightConnector1">
@@ -4734,7 +4742,7 @@
         </p:nvSpPr>
         <p:spPr>
           <a:xfrm>
-            <a:off x="6769057" y="3331589"/>
+            <a:off x="6769057" y="3896010"/>
             <a:ext cx="1495737" cy="184666"/>
           </a:xfrm>
           <a:prstGeom prst="rect">
@@ -4779,7 +4787,7 @@
         </p:nvCxnSpPr>
         <p:spPr>
           <a:xfrm>
-            <a:off x="4820052" y="3885683"/>
+            <a:off x="4820052" y="4450104"/>
             <a:ext cx="3536035" cy="517"/>
           </a:xfrm>
           <a:prstGeom prst="straightConnector1">
@@ -4817,7 +4825,7 @@
         </p:nvSpPr>
         <p:spPr>
           <a:xfrm>
-            <a:off x="6022763" y="3613816"/>
+            <a:off x="6022763" y="4178237"/>
             <a:ext cx="220343" cy="215444"/>
           </a:xfrm>
           <a:prstGeom prst="rect">
@@ -4857,7 +4865,7 @@
         </p:nvSpPr>
         <p:spPr>
           <a:xfrm>
-            <a:off x="8323341" y="3553257"/>
+            <a:off x="8323341" y="4117678"/>
             <a:ext cx="181795" cy="409143"/>
           </a:xfrm>
           <a:prstGeom prst="rect">
@@ -4904,7 +4912,7 @@
         </p:nvSpPr>
         <p:spPr>
           <a:xfrm>
-            <a:off x="4865266" y="3997118"/>
+            <a:off x="4865266" y="4561539"/>
             <a:ext cx="446103" cy="543861"/>
           </a:xfrm>
           <a:prstGeom prst="curvedLeftArrow">
@@ -4957,7 +4965,7 @@
         </p:nvSpPr>
         <p:spPr>
           <a:xfrm>
-            <a:off x="5233332" y="4092566"/>
+            <a:off x="5233332" y="4656987"/>
             <a:ext cx="1260511" cy="369332"/>
           </a:xfrm>
           <a:prstGeom prst="rect">
@@ -5009,7 +5017,7 @@
         </p:nvCxnSpPr>
         <p:spPr>
           <a:xfrm flipV="1">
-            <a:off x="2373339" y="4527946"/>
+            <a:off x="2373339" y="5092367"/>
             <a:ext cx="2435233" cy="13033"/>
           </a:xfrm>
           <a:prstGeom prst="straightConnector1">
@@ -5047,7 +5055,7 @@
         </p:nvSpPr>
         <p:spPr>
           <a:xfrm>
-            <a:off x="2756585" y="4267055"/>
+            <a:off x="2756585" y="4813756"/>
             <a:ext cx="762000" cy="215444"/>
           </a:xfrm>
           <a:prstGeom prst="rect">
@@ -5076,6 +5084,213 @@
               <a:rPr lang="en-US" dirty="0"/>
               <a:t>result</a:t>
             </a:r>
+          </a:p>
+        </p:txBody>
+      </p:sp>
+      <p:cxnSp>
+        <p:nvCxnSpPr>
+          <p:cNvPr id="38" name="Straight Arrow Connector 37"/>
+          <p:cNvCxnSpPr/>
+          <p:nvPr/>
+        </p:nvCxnSpPr>
+        <p:spPr>
+          <a:xfrm flipV="1">
+            <a:off x="2316667" y="1875719"/>
+            <a:ext cx="2357305" cy="11689"/>
+          </a:xfrm>
+          <a:prstGeom prst="straightConnector1">
+            <a:avLst/>
+          </a:prstGeom>
+          <a:ln w="19050">
+            <a:solidFill>
+              <a:srgbClr val="0070C0"/>
+            </a:solidFill>
+            <a:prstDash val="sysDash"/>
+            <a:headEnd type="arrow" w="med" len="med"/>
+            <a:tailEnd type="none" w="med" len="med"/>
+          </a:ln>
+        </p:spPr>
+        <p:style>
+          <a:lnRef idx="1">
+            <a:schemeClr val="accent1"/>
+          </a:lnRef>
+          <a:fillRef idx="0">
+            <a:schemeClr val="accent1"/>
+          </a:fillRef>
+          <a:effectRef idx="0">
+            <a:schemeClr val="accent1"/>
+          </a:effectRef>
+          <a:fontRef idx="minor">
+            <a:schemeClr val="tx1"/>
+          </a:fontRef>
+        </p:style>
+      </p:cxnSp>
+      <p:sp>
+        <p:nvSpPr>
+          <p:cNvPr id="39" name="TextBox 38"/>
+          <p:cNvSpPr txBox="1"/>
+          <p:nvPr/>
+        </p:nvSpPr>
+        <p:spPr>
+          <a:xfrm>
+            <a:off x="3454787" y="1637552"/>
+            <a:ext cx="220343" cy="215444"/>
+          </a:xfrm>
+          <a:prstGeom prst="rect">
+            <a:avLst/>
+          </a:prstGeom>
+          <a:noFill/>
+        </p:spPr>
+        <p:txBody>
+          <a:bodyPr wrap="square" lIns="0" tIns="0" rIns="0" bIns="0" rtlCol="0">
+            <a:spAutoFit/>
+          </a:bodyPr>
+          <a:lstStyle>
+            <a:defPPr>
+              <a:defRPr lang="en-US"/>
+            </a:defPPr>
+            <a:lvl1pPr algn="r">
+              <a:defRPr sz="1400">
+                <a:solidFill>
+                  <a:srgbClr val="0070C0"/>
+                </a:solidFill>
+              </a:defRPr>
+            </a:lvl1pPr>
+          </a:lstStyle>
+          <a:p>
+            <a:r>
+              <a:rPr lang="en-US" dirty="0"/>
+              <a:t>s</a:t>
+            </a:r>
+            <a:endParaRPr lang="en-US" dirty="0"/>
+          </a:p>
+        </p:txBody>
+      </p:sp>
+      <p:sp>
+        <p:nvSpPr>
+          <p:cNvPr id="41" name="Rectangle 40"/>
+          <p:cNvSpPr/>
+          <p:nvPr/>
+        </p:nvSpPr>
+        <p:spPr>
+          <a:xfrm>
+            <a:off x="4619524" y="2139830"/>
+            <a:ext cx="245742" cy="3041769"/>
+          </a:xfrm>
+          <a:prstGeom prst="rect">
+            <a:avLst/>
+          </a:prstGeom>
+          <a:solidFill>
+            <a:srgbClr val="0070C0"/>
+          </a:solidFill>
+          <a:ln>
+            <a:solidFill>
+              <a:srgbClr val="0070C0"/>
+            </a:solidFill>
+          </a:ln>
+          <a:effectLst/>
+        </p:spPr>
+        <p:style>
+          <a:lnRef idx="1">
+            <a:schemeClr val="accent3"/>
+          </a:lnRef>
+          <a:fillRef idx="2">
+            <a:schemeClr val="accent3"/>
+          </a:fillRef>
+          <a:effectRef idx="1">
+            <a:schemeClr val="accent3"/>
+          </a:effectRef>
+          <a:fontRef idx="minor">
+            <a:schemeClr val="dk1"/>
+          </a:fontRef>
+        </p:style>
+        <p:txBody>
+          <a:bodyPr rtlCol="0" anchor="ctr"/>
+          <a:lstStyle/>
+          <a:p>
+            <a:pPr algn="ctr"/>
+            <a:endParaRPr lang="en-SG" sz="1400">
+              <a:solidFill>
+                <a:schemeClr val="dk1"/>
+              </a:solidFill>
+            </a:endParaRPr>
+          </a:p>
+        </p:txBody>
+      </p:sp>
+      <p:cxnSp>
+        <p:nvCxnSpPr>
+          <p:cNvPr id="42" name="Straight Arrow Connector 41"/>
+          <p:cNvCxnSpPr/>
+          <p:nvPr/>
+        </p:nvCxnSpPr>
+        <p:spPr>
+          <a:xfrm flipV="1">
+            <a:off x="2423080" y="2190882"/>
+            <a:ext cx="2212212" cy="18918"/>
+          </a:xfrm>
+          <a:prstGeom prst="straightConnector1">
+            <a:avLst/>
+          </a:prstGeom>
+          <a:ln w="19050">
+            <a:solidFill>
+              <a:srgbClr val="0070C0"/>
+            </a:solidFill>
+            <a:tailEnd type="arrow"/>
+          </a:ln>
+        </p:spPr>
+        <p:style>
+          <a:lnRef idx="1">
+            <a:schemeClr val="accent1"/>
+          </a:lnRef>
+          <a:fillRef idx="0">
+            <a:schemeClr val="accent1"/>
+          </a:fillRef>
+          <a:effectRef idx="0">
+            <a:schemeClr val="accent1"/>
+          </a:effectRef>
+          <a:fontRef idx="minor">
+            <a:schemeClr val="tx1"/>
+          </a:fontRef>
+        </p:style>
+      </p:cxnSp>
+      <p:sp>
+        <p:nvSpPr>
+          <p:cNvPr id="45" name="TextBox 44"/>
+          <p:cNvSpPr txBox="1"/>
+          <p:nvPr/>
+        </p:nvSpPr>
+        <p:spPr>
+          <a:xfrm>
+            <a:off x="3429000" y="2025134"/>
+            <a:ext cx="907505" cy="184666"/>
+          </a:xfrm>
+          <a:prstGeom prst="rect">
+            <a:avLst/>
+          </a:prstGeom>
+          <a:noFill/>
+        </p:spPr>
+        <p:txBody>
+          <a:bodyPr wrap="square" lIns="0" tIns="0" rIns="0" bIns="0" rtlCol="0">
+            <a:spAutoFit/>
+          </a:bodyPr>
+          <a:lstStyle>
+            <a:defPPr>
+              <a:defRPr lang="en-US"/>
+            </a:defPPr>
+            <a:lvl1pPr algn="r">
+              <a:defRPr sz="1400">
+                <a:solidFill>
+                  <a:srgbClr val="0070C0"/>
+                </a:solidFill>
+              </a:defRPr>
+            </a:lvl1pPr>
+          </a:lstStyle>
+          <a:p>
+            <a:r>
+              <a:rPr lang="en-US" sz="1200" dirty="0" smtClean="0"/>
+              <a:t>execute()</a:t>
+            </a:r>
+            <a:endParaRPr lang="en-US" sz="1200" dirty="0"/>
           </a:p>
         </p:txBody>
       </p:sp>

</xml_diff>